<commit_message>
added dynamic ul of wiki results
</commit_message>
<xml_diff>
--- a/Marvel Mythos – Team 3 presentation.pptx
+++ b/Marvel Mythos – Team 3 presentation.pptx
@@ -156,7 +156,7 @@
 <file path=ppt/revisionInfo.xml><?xml version="1.0" encoding="utf-8"?>
 <p1510:revInfo xmlns:a="http://schemas.openxmlformats.org/drawingml/2006/main" xmlns:r="http://schemas.openxmlformats.org/officeDocument/2006/relationships" xmlns:p1510="http://schemas.microsoft.com/office/powerpoint/2015/10/main">
   <p1510:revLst>
-    <p1510:client id="{62B85F74-5622-49F0-88E5-8A7B5185DCBB}" v="1190" dt="2022-01-16T21:38:44.665"/>
+    <p1510:client id="{3248B7F9-45F9-4CE3-8030-0C538460C18B}" v="113" dt="2022-01-19T21:11:17.582"/>
   </p1510:revLst>
 </p1510:revInfo>
 </file>
@@ -566,6 +566,68 @@
           </pc:cxnChg>
         </pc:sldLayoutChg>
       </pc:sldMasterChg>
+    </pc:docChg>
+  </pc:docChgLst>
+  <pc:docChgLst>
+    <pc:chgData name="Smith, Carlie" userId="7d12dd53-45e7-47d9-afbe-a335b45c4b73" providerId="ADAL" clId="{3248B7F9-45F9-4CE3-8030-0C538460C18B}"/>
+    <pc:docChg chg="modSld">
+      <pc:chgData name="Smith, Carlie" userId="7d12dd53-45e7-47d9-afbe-a335b45c4b73" providerId="ADAL" clId="{3248B7F9-45F9-4CE3-8030-0C538460C18B}" dt="2022-01-19T21:11:17.582" v="119" actId="20577"/>
+      <pc:docMkLst>
+        <pc:docMk/>
+      </pc:docMkLst>
+      <pc:sldChg chg="modSp mod">
+        <pc:chgData name="Smith, Carlie" userId="7d12dd53-45e7-47d9-afbe-a335b45c4b73" providerId="ADAL" clId="{3248B7F9-45F9-4CE3-8030-0C538460C18B}" dt="2022-01-19T21:02:16.392" v="53" actId="1076"/>
+        <pc:sldMkLst>
+          <pc:docMk/>
+          <pc:sldMk cId="1440682489" sldId="259"/>
+        </pc:sldMkLst>
+        <pc:picChg chg="mod">
+          <ac:chgData name="Smith, Carlie" userId="7d12dd53-45e7-47d9-afbe-a335b45c4b73" providerId="ADAL" clId="{3248B7F9-45F9-4CE3-8030-0C538460C18B}" dt="2022-01-19T21:02:16.392" v="53" actId="1076"/>
+          <ac:picMkLst>
+            <pc:docMk/>
+            <pc:sldMk cId="1440682489" sldId="259"/>
+            <ac:picMk id="21" creationId="{EC1FB5B0-3363-4017-96CA-73A3156770D6}"/>
+          </ac:picMkLst>
+        </pc:picChg>
+      </pc:sldChg>
+      <pc:sldChg chg="modSp mod">
+        <pc:chgData name="Smith, Carlie" userId="7d12dd53-45e7-47d9-afbe-a335b45c4b73" providerId="ADAL" clId="{3248B7F9-45F9-4CE3-8030-0C538460C18B}" dt="2022-01-19T21:11:17.582" v="119" actId="20577"/>
+        <pc:sldMkLst>
+          <pc:docMk/>
+          <pc:sldMk cId="851164265" sldId="261"/>
+        </pc:sldMkLst>
+        <pc:spChg chg="mod">
+          <ac:chgData name="Smith, Carlie" userId="7d12dd53-45e7-47d9-afbe-a335b45c4b73" providerId="ADAL" clId="{3248B7F9-45F9-4CE3-8030-0C538460C18B}" dt="2022-01-19T01:29:33.362" v="6" actId="20577"/>
+          <ac:spMkLst>
+            <pc:docMk/>
+            <pc:sldMk cId="851164265" sldId="261"/>
+            <ac:spMk id="2" creationId="{E920A5AC-B286-4927-A556-E62F15F9785E}"/>
+          </ac:spMkLst>
+        </pc:spChg>
+        <pc:graphicFrameChg chg="mod">
+          <ac:chgData name="Smith, Carlie" userId="7d12dd53-45e7-47d9-afbe-a335b45c4b73" providerId="ADAL" clId="{3248B7F9-45F9-4CE3-8030-0C538460C18B}" dt="2022-01-19T21:11:17.582" v="119" actId="20577"/>
+          <ac:graphicFrameMkLst>
+            <pc:docMk/>
+            <pc:sldMk cId="851164265" sldId="261"/>
+            <ac:graphicFrameMk id="4" creationId="{3F3F2756-2E70-4E81-9B93-4AC1BABBED19}"/>
+          </ac:graphicFrameMkLst>
+        </pc:graphicFrameChg>
+      </pc:sldChg>
+      <pc:sldChg chg="modSp mod">
+        <pc:chgData name="Smith, Carlie" userId="7d12dd53-45e7-47d9-afbe-a335b45c4b73" providerId="ADAL" clId="{3248B7F9-45F9-4CE3-8030-0C538460C18B}" dt="2022-01-19T21:01:42.955" v="52" actId="1076"/>
+        <pc:sldMkLst>
+          <pc:docMk/>
+          <pc:sldMk cId="644026407" sldId="265"/>
+        </pc:sldMkLst>
+        <pc:spChg chg="mod">
+          <ac:chgData name="Smith, Carlie" userId="7d12dd53-45e7-47d9-afbe-a335b45c4b73" providerId="ADAL" clId="{3248B7F9-45F9-4CE3-8030-0C538460C18B}" dt="2022-01-19T21:01:42.955" v="52" actId="1076"/>
+          <ac:spMkLst>
+            <pc:docMk/>
+            <pc:sldMk cId="644026407" sldId="265"/>
+            <ac:spMk id="5" creationId="{71BAAEE9-A435-49AC-B0C7-B3C2B4E1A90A}"/>
+          </ac:spMkLst>
+        </pc:spChg>
+      </pc:sldChg>
     </pc:docChg>
   </pc:docChgLst>
 </pc:chgInfo>
@@ -3315,7 +3377,7 @@
               <a:ea typeface="+mn-ea"/>
               <a:cs typeface="+mn-cs"/>
             </a:rPr>
-            <a:t>Coordination: Carlie</a:t>
+            <a:t>Design: Nathan</a:t>
           </a:r>
         </a:p>
       </dgm:t>
@@ -3364,7 +3426,7 @@
               <a:ea typeface="+mn-ea"/>
               <a:cs typeface="+mn-cs"/>
             </a:rPr>
-            <a:t>Team member availability, scope creep</a:t>
+            <a:t>Team member availability, scope creep, GitHub</a:t>
           </a:r>
         </a:p>
       </dgm:t>
@@ -3467,8 +3529,29 @@
               <a:ea typeface="+mn-ea"/>
               <a:cs typeface="+mn-cs"/>
             </a:rPr>
-            <a:t>Early API connection, project theme enthusiasm, </a:t>
+            <a:t>Early API connection, project theme enthusiasm, adapting to </a:t>
           </a:r>
+          <a:r>
+            <a:rPr lang="en-US" kern="1200" err="1">
+              <a:latin typeface="Century Gothic" panose="020B0502020202020204"/>
+              <a:ea typeface="+mn-ea"/>
+              <a:cs typeface="+mn-cs"/>
+            </a:rPr>
+            <a:t>Bulma</a:t>
+          </a:r>
+          <a:r>
+            <a:rPr lang="en-US" kern="1200">
+              <a:latin typeface="Century Gothic" panose="020B0502020202020204"/>
+              <a:ea typeface="+mn-ea"/>
+              <a:cs typeface="+mn-cs"/>
+            </a:rPr>
+            <a:t>.io </a:t>
+          </a:r>
+          <a:endParaRPr lang="en-US" kern="1200" dirty="0">
+            <a:latin typeface="Century Gothic" panose="020B0502020202020204"/>
+            <a:ea typeface="+mn-ea"/>
+            <a:cs typeface="+mn-cs"/>
+          </a:endParaRPr>
         </a:p>
       </dgm:t>
     </dgm:pt>
@@ -3971,55 +4054,6 @@
         </a:p>
       </dgm:t>
     </dgm:pt>
-    <dgm:pt modelId="{F627DFE1-468C-4AD1-81B5-15C700E3037D}">
-      <dgm:prSet phldrT="[Text]"/>
-      <dgm:spPr/>
-      <dgm:t>
-        <a:bodyPr lIns="108000" tIns="432000" rIns="288000" anchor="t" anchorCtr="0"/>
-        <a:lstStyle/>
-        <a:p>
-          <a:pPr marL="0" lvl="0" indent="0" defTabSz="533400">
-            <a:spcBef>
-              <a:spcPct val="0"/>
-            </a:spcBef>
-            <a:spcAft>
-              <a:spcPts val="0"/>
-            </a:spcAft>
-            <a:buNone/>
-          </a:pPr>
-          <a:r>
-            <a:rPr lang="en-US" kern="1200" dirty="0">
-              <a:latin typeface="Century Gothic" panose="020B0502020202020204"/>
-              <a:ea typeface="+mn-ea"/>
-              <a:cs typeface="+mn-cs"/>
-            </a:rPr>
-            <a:t>Design: Erik, Shatyana, Nathan</a:t>
-          </a:r>
-        </a:p>
-      </dgm:t>
-    </dgm:pt>
-    <dgm:pt modelId="{1DAEA710-E619-465A-B024-3D40D2994D74}" type="parTrans" cxnId="{26203FF7-C937-4981-85FF-15A9EAAE411D}">
-      <dgm:prSet/>
-      <dgm:spPr/>
-      <dgm:t>
-        <a:bodyPr/>
-        <a:lstStyle/>
-        <a:p>
-          <a:endParaRPr lang="en-US"/>
-        </a:p>
-      </dgm:t>
-    </dgm:pt>
-    <dgm:pt modelId="{3094ACB4-3AD5-4F70-BA36-EFC1AB8758CD}" type="sibTrans" cxnId="{26203FF7-C937-4981-85FF-15A9EAAE411D}">
-      <dgm:prSet/>
-      <dgm:spPr/>
-      <dgm:t>
-        <a:bodyPr/>
-        <a:lstStyle/>
-        <a:p>
-          <a:endParaRPr lang="en-US"/>
-        </a:p>
-      </dgm:t>
-    </dgm:pt>
     <dgm:pt modelId="{3D605A6D-25A2-4E5F-8F31-6E4726C4E08C}">
       <dgm:prSet phldrT="[Text]"/>
       <dgm:spPr/>
@@ -4042,7 +4076,7 @@
               <a:ea typeface="+mn-ea"/>
               <a:cs typeface="+mn-cs"/>
             </a:rPr>
-            <a:t>Code: Justin, Alex, Steven</a:t>
+            <a:t>Code: Justin, Alejandro</a:t>
           </a:r>
         </a:p>
       </dgm:t>
@@ -4068,6 +4102,41 @@
           <a:endParaRPr lang="en-US"/>
         </a:p>
       </dgm:t>
+    </dgm:pt>
+    <dgm:pt modelId="{34A96D62-5E52-44C5-B314-91149D8C4F20}">
+      <dgm:prSet phldrT="[Text]"/>
+      <dgm:spPr/>
+      <dgm:t>
+        <a:bodyPr lIns="108000" tIns="432000" rIns="288000" anchor="t" anchorCtr="0"/>
+        <a:lstStyle/>
+        <a:p>
+          <a:pPr marL="0" lvl="0" indent="0" defTabSz="533400">
+            <a:spcBef>
+              <a:spcPct val="0"/>
+            </a:spcBef>
+            <a:spcAft>
+              <a:spcPts val="0"/>
+            </a:spcAft>
+            <a:buNone/>
+          </a:pPr>
+          <a:r>
+            <a:rPr lang="en-US" kern="1200" dirty="0">
+              <a:latin typeface="Century Gothic" panose="020B0502020202020204"/>
+              <a:ea typeface="+mn-ea"/>
+              <a:cs typeface="+mn-cs"/>
+            </a:rPr>
+            <a:t>Coordination: Carlie</a:t>
+          </a:r>
+        </a:p>
+      </dgm:t>
+    </dgm:pt>
+    <dgm:pt modelId="{F4F5E94B-50D3-4087-968A-485C04CAA910}" type="parTrans" cxnId="{EE102469-2715-496E-AB76-FF54DA9BD420}">
+      <dgm:prSet/>
+      <dgm:spPr/>
+    </dgm:pt>
+    <dgm:pt modelId="{FE9C81DF-63D7-4DA6-A4A6-0C207616A606}" type="sibTrans" cxnId="{EE102469-2715-496E-AB76-FF54DA9BD420}">
+      <dgm:prSet/>
+      <dgm:spPr/>
     </dgm:pt>
     <dgm:pt modelId="{B1E42031-0397-428A-8461-4894D801F9E3}" type="pres">
       <dgm:prSet presAssocID="{55C0B14E-AEA6-48D3-A387-ED4A3A3BF840}" presName="linear" presStyleCnt="0">
@@ -4260,13 +4329,13 @@
   <dgm:cxnLst>
     <dgm:cxn modelId="{323B270F-D631-4F79-8068-83F5A955876C}" type="presOf" srcId="{9E838AE2-4659-4603-ABC8-58DF4222C0D4}" destId="{9347F7A8-CA34-4844-AAB1-E613F4ED7830}" srcOrd="0" destOrd="0" presId="urn:microsoft.com/office/officeart/2005/8/layout/list1"/>
     <dgm:cxn modelId="{5BF4950F-47B9-43D4-8B09-6EDB34DC93E5}" type="presOf" srcId="{AACEAFD5-63CF-4AFC-B46F-BE086C5D447C}" destId="{D3ABC724-B38C-40BB-950A-924E90766F15}" srcOrd="0" destOrd="0" presId="urn:microsoft.com/office/officeart/2005/8/layout/list1"/>
-    <dgm:cxn modelId="{1D1C5111-71B4-43D1-A3D2-A6CB73F213C9}" type="presOf" srcId="{F627DFE1-468C-4AD1-81B5-15C700E3037D}" destId="{1AB91C9E-BCD2-4C04-999D-C90748724499}" srcOrd="0" destOrd="1" presId="urn:microsoft.com/office/officeart/2005/8/layout/list1"/>
     <dgm:cxn modelId="{CF54291C-AAFD-4FA4-9A16-20CE892BA907}" srcId="{55C0B14E-AEA6-48D3-A387-ED4A3A3BF840}" destId="{9E838AE2-4659-4603-ABC8-58DF4222C0D4}" srcOrd="4" destOrd="0" parTransId="{5FC53805-9431-4BC8-ADB9-DABF59DE31C7}" sibTransId="{61F1BCD3-232D-4C03-B56C-182BCB6108CD}"/>
     <dgm:cxn modelId="{EBA38635-DE94-4C63-AE6C-5D0CB9B9AB14}" type="presOf" srcId="{D71FC021-6A65-44D1-95B9-0E6C89079866}" destId="{BC7BB018-3E22-45C3-B177-5B15C863AD56}" srcOrd="1" destOrd="0" presId="urn:microsoft.com/office/officeart/2005/8/layout/list1"/>
     <dgm:cxn modelId="{0EFA3039-6828-403C-9445-4359BA6645E6}" srcId="{AACEAFD5-63CF-4AFC-B46F-BE086C5D447C}" destId="{349299C9-846E-4827-813A-349CCCE20782}" srcOrd="0" destOrd="0" parTransId="{AEA27547-B9ED-4994-BD27-04EC297EF367}" sibTransId="{9D819F52-ACA0-4B08-8256-DF6BD8FA3A0B}"/>
     <dgm:cxn modelId="{1D6C5464-DE30-4BEC-9E27-B2C179C39CC4}" srcId="{32CCB050-072A-41BF-BE1B-388CF53E5629}" destId="{04A40292-9119-41B2-B968-7B651F20675D}" srcOrd="0" destOrd="0" parTransId="{70078FF1-F2A9-4A6B-88D1-8CF3595EFE73}" sibTransId="{B4C4972A-0898-484E-AF78-D5D7E0F991F2}"/>
     <dgm:cxn modelId="{6413B965-7194-4C9D-B19A-42B53CC3BE8E}" type="presOf" srcId="{AACEAFD5-63CF-4AFC-B46F-BE086C5D447C}" destId="{CF2CE1C0-2E2F-4964-8DDD-C8973D1B1CEF}" srcOrd="1" destOrd="0" presId="urn:microsoft.com/office/officeart/2005/8/layout/list1"/>
     <dgm:cxn modelId="{55492768-9A5E-4F74-AC7C-959C5C24EFD3}" srcId="{55C0B14E-AEA6-48D3-A387-ED4A3A3BF840}" destId="{D07AD3FD-84FF-467E-9693-752776549C61}" srcOrd="1" destOrd="0" parTransId="{7B691773-F524-4FAD-A272-BDF0B0C4370A}" sibTransId="{A8C9B7A9-BC2A-4753-B7F0-F2E361D95520}"/>
+    <dgm:cxn modelId="{EE102469-2715-496E-AB76-FF54DA9BD420}" srcId="{AACEAFD5-63CF-4AFC-B46F-BE086C5D447C}" destId="{34A96D62-5E52-44C5-B314-91149D8C4F20}" srcOrd="2" destOrd="0" parTransId="{F4F5E94B-50D3-4087-968A-485C04CAA910}" sibTransId="{FE9C81DF-63D7-4DA6-A4A6-0C207616A606}"/>
     <dgm:cxn modelId="{AC53C64E-5AB2-48E2-BF1E-9062FC973377}" srcId="{32CCB050-072A-41BF-BE1B-388CF53E5629}" destId="{917ED249-D4CB-4EDA-85E4-319E2347D2BE}" srcOrd="1" destOrd="0" parTransId="{9BC84233-4F71-4970-B83A-0EFBAEE97C87}" sibTransId="{182F1551-5AE2-4145-B40F-4FEEA202BCB9}"/>
     <dgm:cxn modelId="{E97FF64F-8020-497E-AE7D-2395DDA4560D}" srcId="{D07AD3FD-84FF-467E-9693-752776549C61}" destId="{5D70EFF5-8B31-4A1F-AE44-51E4CF0013EB}" srcOrd="0" destOrd="0" parTransId="{96C720A0-FEEF-48D1-8DF6-ABA03C304822}" sibTransId="{B6A59CDE-18AD-4553-B6C5-FF001A8E8510}"/>
     <dgm:cxn modelId="{50B58850-5706-46BE-9C01-2AF70FFC4556}" type="presOf" srcId="{D07AD3FD-84FF-467E-9693-752776549C61}" destId="{FD48DB33-618C-48C7-839D-76A7A221037D}" srcOrd="1" destOrd="0" presId="urn:microsoft.com/office/officeart/2005/8/layout/list1"/>
@@ -4274,13 +4343,13 @@
     <dgm:cxn modelId="{2E0E9A92-078D-4656-8F58-3D0B672EC951}" type="presOf" srcId="{917ED249-D4CB-4EDA-85E4-319E2347D2BE}" destId="{546AE2F3-7D03-4697-980F-A994E206F83F}" srcOrd="0" destOrd="1" presId="urn:microsoft.com/office/officeart/2005/8/layout/list1"/>
     <dgm:cxn modelId="{53239C96-427C-420B-95DC-546F3B30ED65}" srcId="{55C0B14E-AEA6-48D3-A387-ED4A3A3BF840}" destId="{D71FC021-6A65-44D1-95B9-0E6C89079866}" srcOrd="2" destOrd="0" parTransId="{862AAE39-3AAD-40E3-BA20-90187BD73242}" sibTransId="{9B090D9D-470E-46E2-AABB-0368A52481AA}"/>
     <dgm:cxn modelId="{4C08EF96-EFF6-4B5C-B404-87227BA4E53B}" type="presOf" srcId="{D71FC021-6A65-44D1-95B9-0E6C89079866}" destId="{A05F7D31-84D7-47CD-8655-2DDFBB9DB03C}" srcOrd="0" destOrd="0" presId="urn:microsoft.com/office/officeart/2005/8/layout/list1"/>
-    <dgm:cxn modelId="{D9519DA0-64B8-4DF2-9F13-D2624F7D2E5B}" type="presOf" srcId="{3D605A6D-25A2-4E5F-8F31-6E4726C4E08C}" destId="{1AB91C9E-BCD2-4C04-999D-C90748724499}" srcOrd="0" destOrd="2" presId="urn:microsoft.com/office/officeart/2005/8/layout/list1"/>
+    <dgm:cxn modelId="{D9519DA0-64B8-4DF2-9F13-D2624F7D2E5B}" type="presOf" srcId="{3D605A6D-25A2-4E5F-8F31-6E4726C4E08C}" destId="{1AB91C9E-BCD2-4C04-999D-C90748724499}" srcOrd="0" destOrd="1" presId="urn:microsoft.com/office/officeart/2005/8/layout/list1"/>
     <dgm:cxn modelId="{17BD67AD-4331-49EC-BC4A-29404E891597}" srcId="{9E838AE2-4659-4603-ABC8-58DF4222C0D4}" destId="{C8E903CE-0CFD-4D68-A857-80E14557005E}" srcOrd="0" destOrd="0" parTransId="{D5890537-0D77-4DA1-A100-62C393623468}" sibTransId="{862799CE-00F4-4DD6-894E-A487503F8DE6}"/>
     <dgm:cxn modelId="{8C5C2FB1-AF6D-4D61-8064-68F5E58CE9D7}" type="presOf" srcId="{32CCB050-072A-41BF-BE1B-388CF53E5629}" destId="{ACABAA26-F468-489B-B93F-1BE8BD567CC1}" srcOrd="1" destOrd="0" presId="urn:microsoft.com/office/officeart/2005/8/layout/list1"/>
     <dgm:cxn modelId="{AE101ABC-7EA3-4444-A576-8AB15A371C84}" srcId="{55C0B14E-AEA6-48D3-A387-ED4A3A3BF840}" destId="{AACEAFD5-63CF-4AFC-B46F-BE086C5D447C}" srcOrd="0" destOrd="0" parTransId="{7A0BD8EC-BB4A-4912-A54E-6F39B681264E}" sibTransId="{7A8D4B4D-06E9-4958-810D-A6226B6AC588}"/>
     <dgm:cxn modelId="{97114FBD-8A73-4D52-BD36-E0EB1ACAE5AF}" type="presOf" srcId="{5D70EFF5-8B31-4A1F-AE44-51E4CF0013EB}" destId="{F051181B-2248-4933-B71F-9A82F361B77B}" srcOrd="0" destOrd="0" presId="urn:microsoft.com/office/officeart/2005/8/layout/list1"/>
     <dgm:cxn modelId="{9C29ABC3-58A2-4B81-A14D-E4A6AD12EADB}" type="presOf" srcId="{4A6BB192-9983-4F48-BBC5-6E384EED7EC5}" destId="{6DA33DEB-55BE-43DF-A2C3-68DA1FDC4C78}" srcOrd="0" destOrd="0" presId="urn:microsoft.com/office/officeart/2005/8/layout/list1"/>
-    <dgm:cxn modelId="{E79366C4-C260-4D92-909A-0C82350B8F7C}" srcId="{AACEAFD5-63CF-4AFC-B46F-BE086C5D447C}" destId="{3D605A6D-25A2-4E5F-8F31-6E4726C4E08C}" srcOrd="2" destOrd="0" parTransId="{F93DD34C-B560-4A5A-AF8B-E7B848936652}" sibTransId="{75A5DDDB-C166-430B-A888-C3A2407F9327}"/>
+    <dgm:cxn modelId="{E79366C4-C260-4D92-909A-0C82350B8F7C}" srcId="{AACEAFD5-63CF-4AFC-B46F-BE086C5D447C}" destId="{3D605A6D-25A2-4E5F-8F31-6E4726C4E08C}" srcOrd="1" destOrd="0" parTransId="{F93DD34C-B560-4A5A-AF8B-E7B848936652}" sibTransId="{75A5DDDB-C166-430B-A888-C3A2407F9327}"/>
     <dgm:cxn modelId="{EABBBBCD-F3B5-4567-B3C9-0CAFBAA43B3E}" type="presOf" srcId="{32CCB050-072A-41BF-BE1B-388CF53E5629}" destId="{7921CC5D-A64C-462A-B995-73784AE5A62C}" srcOrd="0" destOrd="0" presId="urn:microsoft.com/office/officeart/2005/8/layout/list1"/>
     <dgm:cxn modelId="{E051C6D7-B268-4052-97EA-053A46C07EF3}" type="presOf" srcId="{04A40292-9119-41B2-B968-7B651F20675D}" destId="{546AE2F3-7D03-4697-980F-A994E206F83F}" srcOrd="0" destOrd="0" presId="urn:microsoft.com/office/officeart/2005/8/layout/list1"/>
     <dgm:cxn modelId="{042E0AE1-6450-410A-B96E-AFBADB139BEA}" srcId="{55C0B14E-AEA6-48D3-A387-ED4A3A3BF840}" destId="{32CCB050-072A-41BF-BE1B-388CF53E5629}" srcOrd="3" destOrd="0" parTransId="{B301371B-A53D-4B79-8B8D-7B304894442B}" sibTransId="{BF05D8EE-4413-4737-8721-DAF10D6CAB04}"/>
@@ -4288,8 +4357,8 @@
     <dgm:cxn modelId="{B88D61E2-4245-4D76-8BE4-E691E661804D}" type="presOf" srcId="{D07AD3FD-84FF-467E-9693-752776549C61}" destId="{605689C2-C5A6-424E-9E98-60D687761A3D}" srcOrd="0" destOrd="0" presId="urn:microsoft.com/office/officeart/2005/8/layout/list1"/>
     <dgm:cxn modelId="{104C97E8-16D9-437C-8B95-C383951BCCD0}" type="presOf" srcId="{C8E903CE-0CFD-4D68-A857-80E14557005E}" destId="{9D1591CD-5BFF-4E0A-8286-EEDD9ED6AC3E}" srcOrd="0" destOrd="0" presId="urn:microsoft.com/office/officeart/2005/8/layout/list1"/>
     <dgm:cxn modelId="{D080A3E9-89EE-43CF-8931-A1087F6D0D78}" type="presOf" srcId="{55C0B14E-AEA6-48D3-A387-ED4A3A3BF840}" destId="{B1E42031-0397-428A-8461-4894D801F9E3}" srcOrd="0" destOrd="0" presId="urn:microsoft.com/office/officeart/2005/8/layout/list1"/>
+    <dgm:cxn modelId="{8D2F16EA-0E49-4278-9630-55D9F0EDD9B9}" type="presOf" srcId="{34A96D62-5E52-44C5-B314-91149D8C4F20}" destId="{1AB91C9E-BCD2-4C04-999D-C90748724499}" srcOrd="0" destOrd="2" presId="urn:microsoft.com/office/officeart/2005/8/layout/list1"/>
     <dgm:cxn modelId="{E3115EEA-DE9C-4F06-B8B3-BEB263D5F2B1}" srcId="{D71FC021-6A65-44D1-95B9-0E6C89079866}" destId="{4A6BB192-9983-4F48-BBC5-6E384EED7EC5}" srcOrd="0" destOrd="0" parTransId="{230A6E4A-6CED-4DC0-AEFE-6859FE07B658}" sibTransId="{0B568EC2-5D2A-4B00-8047-B7832F245B44}"/>
-    <dgm:cxn modelId="{26203FF7-C937-4981-85FF-15A9EAAE411D}" srcId="{AACEAFD5-63CF-4AFC-B46F-BE086C5D447C}" destId="{F627DFE1-468C-4AD1-81B5-15C700E3037D}" srcOrd="1" destOrd="0" parTransId="{1DAEA710-E619-465A-B024-3D40D2994D74}" sibTransId="{3094ACB4-3AD5-4F70-BA36-EFC1AB8758CD}"/>
     <dgm:cxn modelId="{271BFB07-8E3C-4353-9E97-0AD58C994E9C}" type="presParOf" srcId="{B1E42031-0397-428A-8461-4894D801F9E3}" destId="{A4F88A93-84E9-4A07-92E7-DBA0D4633642}" srcOrd="0" destOrd="0" presId="urn:microsoft.com/office/officeart/2005/8/layout/list1"/>
     <dgm:cxn modelId="{0F87C7B0-08CD-4FC2-84D1-94B5F6929F67}" type="presParOf" srcId="{A4F88A93-84E9-4A07-92E7-DBA0D4633642}" destId="{D3ABC724-B38C-40BB-950A-924E90766F15}" srcOrd="0" destOrd="0" presId="urn:microsoft.com/office/officeart/2005/8/layout/list1"/>
     <dgm:cxn modelId="{44F9D823-64C2-4D4B-8AD6-DBFC985C2956}" type="presParOf" srcId="{A4F88A93-84E9-4A07-92E7-DBA0D4633642}" destId="{CF2CE1C0-2E2F-4964-8DDD-C8973D1B1CEF}" srcOrd="1" destOrd="0" presId="urn:microsoft.com/office/officeart/2005/8/layout/list1"/>
@@ -5421,7 +5490,7 @@
               <a:ea typeface="+mn-ea"/>
               <a:cs typeface="+mn-cs"/>
             </a:rPr>
-            <a:t>Coordination: Carlie</a:t>
+            <a:t>Design: Nathan</a:t>
           </a:r>
         </a:p>
         <a:p>
@@ -5443,7 +5512,7 @@
               <a:ea typeface="+mn-ea"/>
               <a:cs typeface="+mn-cs"/>
             </a:rPr>
-            <a:t>Design: Erik, Shatyana, Nathan</a:t>
+            <a:t>Code: Justin, Alejandro</a:t>
           </a:r>
         </a:p>
         <a:p>
@@ -5465,7 +5534,7 @@
               <a:ea typeface="+mn-ea"/>
               <a:cs typeface="+mn-cs"/>
             </a:rPr>
-            <a:t>Code: Justin, Alex, Steven</a:t>
+            <a:t>Coordination: Carlie</a:t>
           </a:r>
         </a:p>
       </dsp:txBody>
@@ -5675,7 +5744,7 @@
               <a:ea typeface="+mn-ea"/>
               <a:cs typeface="+mn-cs"/>
             </a:rPr>
-            <a:t>Team member availability, scope creep</a:t>
+            <a:t>Team member availability, scope creep, GitHub</a:t>
           </a:r>
         </a:p>
       </dsp:txBody>
@@ -5854,8 +5923,29 @@
               <a:ea typeface="+mn-ea"/>
               <a:cs typeface="+mn-cs"/>
             </a:rPr>
-            <a:t>Early API connection, project theme enthusiasm, </a:t>
+            <a:t>Early API connection, project theme enthusiasm, adapting to </a:t>
           </a:r>
+          <a:r>
+            <a:rPr lang="en-US" sz="1300" kern="1200" err="1">
+              <a:latin typeface="Century Gothic" panose="020B0502020202020204"/>
+              <a:ea typeface="+mn-ea"/>
+              <a:cs typeface="+mn-cs"/>
+            </a:rPr>
+            <a:t>Bulma</a:t>
+          </a:r>
+          <a:r>
+            <a:rPr lang="en-US" sz="1300" kern="1200">
+              <a:latin typeface="Century Gothic" panose="020B0502020202020204"/>
+              <a:ea typeface="+mn-ea"/>
+              <a:cs typeface="+mn-cs"/>
+            </a:rPr>
+            <a:t>.io </a:t>
+          </a:r>
+          <a:endParaRPr lang="en-US" sz="1300" kern="1200" dirty="0">
+            <a:latin typeface="Century Gothic" panose="020B0502020202020204"/>
+            <a:ea typeface="+mn-ea"/>
+            <a:cs typeface="+mn-cs"/>
+          </a:endParaRPr>
         </a:p>
       </dsp:txBody>
       <dsp:txXfrm>
@@ -9232,7 +9322,7 @@
           <a:p>
             <a:fld id="{BE6ADB54-F1AF-44F8-8ED0-867524639FE1}" type="datetimeFigureOut">
               <a:rPr lang="en-US" smtClean="0"/>
-              <a:t>1/16/2022</a:t>
+              <a:t>1/18/2022</a:t>
             </a:fld>
             <a:endParaRPr lang="en-US" dirty="0"/>
           </a:p>
@@ -9409,7 +9499,7 @@
           <a:p>
             <a:fld id="{357E5575-CAFE-4A42-A774-E4652BA723C1}" type="datetimeFigureOut">
               <a:rPr lang="en-US" smtClean="0"/>
-              <a:t>1/16/2022</a:t>
+              <a:t>1/18/2022</a:t>
             </a:fld>
             <a:endParaRPr lang="en-US" dirty="0"/>
           </a:p>
@@ -16197,7 +16287,7 @@
         </p:nvSpPr>
         <p:spPr>
           <a:xfrm>
-            <a:off x="6095998" y="685801"/>
+            <a:off x="5933360" y="495301"/>
             <a:ext cx="5758271" cy="3801532"/>
           </a:xfrm>
         </p:spPr>
@@ -17503,7 +17593,7 @@
         </p:blipFill>
         <p:spPr>
           <a:xfrm>
-            <a:off x="457200" y="521552"/>
+            <a:off x="568777" y="434467"/>
             <a:ext cx="11195392" cy="5772634"/>
           </a:xfrm>
           <a:prstGeom prst="rect">
@@ -18177,7 +18267,7 @@
                   <a:schemeClr val="bg1"/>
                 </a:solidFill>
               </a:rPr>
-              <a:t>Process</a:t>
+              <a:t>Process &amp; demo</a:t>
             </a:r>
           </a:p>
         </p:txBody>
@@ -18516,7 +18606,7 @@
             <p:ph idx="1"/>
             <p:extLst>
               <p:ext uri="{D42A27DB-BD31-4B8C-83A1-F6EECF244321}">
-                <p14:modId xmlns:p14="http://schemas.microsoft.com/office/powerpoint/2010/main" val="308894555"/>
+                <p14:modId xmlns:p14="http://schemas.microsoft.com/office/powerpoint/2010/main" val="2173738946"/>
               </p:ext>
             </p:extLst>
           </p:nvPr>
@@ -19576,23 +19666,6 @@
 </file>
 
 <file path=customXml/item1.xml><?xml version="1.0" encoding="utf-8"?>
-<p:properties xmlns:p="http://schemas.microsoft.com/office/2006/metadata/properties" xmlns:xsi="http://www.w3.org/2001/XMLSchema-instance" xmlns:pc="http://schemas.microsoft.com/office/infopath/2007/PartnerControls">
-  <documentManagement>
-    <MediaServiceKeyPoints xmlns="71af3243-3dd4-4a8d-8c0d-dd76da1f02a5" xsi:nil="true"/>
-  </documentManagement>
-</p:properties>
-</file>
-
-<file path=customXml/item2.xml><?xml version="1.0" encoding="utf-8"?>
-<?mso-contentType ?>
-<FormTemplates xmlns="http://schemas.microsoft.com/sharepoint/v3/contenttype/forms">
-  <Display>DocumentLibraryForm</Display>
-  <Edit>DocumentLibraryForm</Edit>
-  <New>DocumentLibraryForm</New>
-</FormTemplates>
-</file>
-
-<file path=customXml/item3.xml><?xml version="1.0" encoding="utf-8"?>
 <ct:contentTypeSchema xmlns:ct="http://schemas.microsoft.com/office/2006/metadata/contentType" xmlns:ma="http://schemas.microsoft.com/office/2006/metadata/properties/metaAttributes" ct:_="" ma:_="" ma:contentTypeName="Document" ma:contentTypeID="0x01010079F111ED35F8CC479449609E8A0923A6" ma:contentTypeVersion="11" ma:contentTypeDescription="Create a new document." ma:contentTypeScope="" ma:versionID="9677210f24a1be23c92c90fd886aa0aa">
   <xsd:schema xmlns:xsd="http://www.w3.org/2001/XMLSchema" xmlns:xs="http://www.w3.org/2001/XMLSchema" xmlns:p="http://schemas.microsoft.com/office/2006/metadata/properties" xmlns:ns2="71af3243-3dd4-4a8d-8c0d-dd76da1f02a5" xmlns:ns3="16c05727-aa75-4e4a-9b5f-8a80a1165891" targetNamespace="http://schemas.microsoft.com/office/2006/metadata/properties" ma:root="true" ma:fieldsID="60e05723c5c1908df1a1a4ebf11d344e" ns2:_="" ns3:_="">
     <xsd:import namespace="71af3243-3dd4-4a8d-8c0d-dd76da1f02a5"/>
@@ -19803,25 +19876,24 @@
 </ct:contentTypeSchema>
 </file>
 
-<file path=customXml/itemProps1.xml><?xml version="1.0" encoding="utf-8"?>
-<ds:datastoreItem xmlns:ds="http://schemas.openxmlformats.org/officeDocument/2006/customXml" ds:itemID="{6A6599C0-B0B6-415D-9B63-E273EEA0EBF7}">
-  <ds:schemaRefs>
-    <ds:schemaRef ds:uri="http://schemas.microsoft.com/office/2006/metadata/properties"/>
-    <ds:schemaRef ds:uri="http://schemas.microsoft.com/office/infopath/2007/PartnerControls"/>
-    <ds:schemaRef ds:uri="71af3243-3dd4-4a8d-8c0d-dd76da1f02a5"/>
-  </ds:schemaRefs>
-</ds:datastoreItem>
+<file path=customXml/item2.xml><?xml version="1.0" encoding="utf-8"?>
+<?mso-contentType ?>
+<FormTemplates xmlns="http://schemas.microsoft.com/sharepoint/v3/contenttype/forms">
+  <Display>DocumentLibraryForm</Display>
+  <Edit>DocumentLibraryForm</Edit>
+  <New>DocumentLibraryForm</New>
+</FormTemplates>
 </file>
 
-<file path=customXml/itemProps2.xml><?xml version="1.0" encoding="utf-8"?>
-<ds:datastoreItem xmlns:ds="http://schemas.openxmlformats.org/officeDocument/2006/customXml" ds:itemID="{83B6EBAF-D3F1-4C38-B9E9-9D4DBDA13976}">
-  <ds:schemaRefs>
-    <ds:schemaRef ds:uri="http://schemas.microsoft.com/sharepoint/v3/contenttype/forms"/>
-  </ds:schemaRefs>
-</ds:datastoreItem>
+<file path=customXml/item3.xml><?xml version="1.0" encoding="utf-8"?>
+<p:properties xmlns:p="http://schemas.microsoft.com/office/2006/metadata/properties" xmlns:xsi="http://www.w3.org/2001/XMLSchema-instance" xmlns:pc="http://schemas.microsoft.com/office/infopath/2007/PartnerControls">
+  <documentManagement>
+    <MediaServiceKeyPoints xmlns="71af3243-3dd4-4a8d-8c0d-dd76da1f02a5" xsi:nil="true"/>
+  </documentManagement>
+</p:properties>
 </file>
 
-<file path=customXml/itemProps3.xml><?xml version="1.0" encoding="utf-8"?>
+<file path=customXml/itemProps1.xml><?xml version="1.0" encoding="utf-8"?>
 <ds:datastoreItem xmlns:ds="http://schemas.openxmlformats.org/officeDocument/2006/customXml" ds:itemID="{D5E0056C-22F7-43F0-A6CE-AE8B59378E93}">
   <ds:schemaRefs>
     <ds:schemaRef ds:uri="http://schemas.microsoft.com/office/2006/metadata/contentType"/>
@@ -19840,6 +19912,24 @@
 </ds:datastoreItem>
 </file>
 
+<file path=customXml/itemProps2.xml><?xml version="1.0" encoding="utf-8"?>
+<ds:datastoreItem xmlns:ds="http://schemas.openxmlformats.org/officeDocument/2006/customXml" ds:itemID="{83B6EBAF-D3F1-4C38-B9E9-9D4DBDA13976}">
+  <ds:schemaRefs>
+    <ds:schemaRef ds:uri="http://schemas.microsoft.com/sharepoint/v3/contenttype/forms"/>
+  </ds:schemaRefs>
+</ds:datastoreItem>
+</file>
+
+<file path=customXml/itemProps3.xml><?xml version="1.0" encoding="utf-8"?>
+<ds:datastoreItem xmlns:ds="http://schemas.openxmlformats.org/officeDocument/2006/customXml" ds:itemID="{6A6599C0-B0B6-415D-9B63-E273EEA0EBF7}">
+  <ds:schemaRefs>
+    <ds:schemaRef ds:uri="http://schemas.microsoft.com/office/2006/metadata/properties"/>
+    <ds:schemaRef ds:uri="http://schemas.microsoft.com/office/infopath/2007/PartnerControls"/>
+    <ds:schemaRef ds:uri="71af3243-3dd4-4a8d-8c0d-dd76da1f02a5"/>
+  </ds:schemaRefs>
+</ds:datastoreItem>
+</file>
+
 <file path=docMetadata/LabelInfo.xml><?xml version="1.0" encoding="utf-8"?>
 <clbl:labelList xmlns:clbl="http://schemas.microsoft.com/office/2020/mipLabelMetadata">
   <clbl:label id="{807724ff-9999-494f-b257-05dacc46ac87}" enabled="1" method="Standard" siteId="{e58c8e81-abd8-48a8-929d-eb67611b83bd}" removed="0"/>

</xml_diff>